<commit_message>
upload changes to the ppt file
</commit_message>
<xml_diff>
--- a/Java SE 8 Teaching Material/Chapter 10 - Classes and Constructors.pptx
+++ b/Java SE 8 Teaching Material/Chapter 10 - Classes and Constructors.pptx
@@ -1624,7 +1624,7 @@
           <a:p>
             <a:fld id="{7664DC43-F744-704A-A194-E80C7BE54CAA}" type="datetimeFigureOut">
               <a:rPr lang="en-VN" smtClean="0"/>
-              <a:t>11/9/24</a:t>
+              <a:t>09/11/2024</a:t>
             </a:fld>
             <a:endParaRPr lang="en-VN"/>
           </a:p>
@@ -2039,7 +2039,7 @@
           <a:p>
             <a:fld id="{BAA8DE05-51EE-4692-B197-877FA1DAAAED}" type="datetimeFigureOut">
               <a:rPr lang="en-US" smtClean="0"/>
-              <a:t>9/11/24</a:t>
+              <a:t>9/11/2024</a:t>
             </a:fld>
             <a:endParaRPr lang="en-US"/>
           </a:p>
@@ -2237,7 +2237,7 @@
           <a:p>
             <a:fld id="{BAA8DE05-51EE-4692-B197-877FA1DAAAED}" type="datetimeFigureOut">
               <a:rPr lang="en-US" smtClean="0"/>
-              <a:t>9/11/24</a:t>
+              <a:t>9/11/2024</a:t>
             </a:fld>
             <a:endParaRPr lang="en-US"/>
           </a:p>
@@ -2445,7 +2445,7 @@
           <a:p>
             <a:fld id="{BAA8DE05-51EE-4692-B197-877FA1DAAAED}" type="datetimeFigureOut">
               <a:rPr lang="en-US" smtClean="0"/>
-              <a:t>9/11/24</a:t>
+              <a:t>9/11/2024</a:t>
             </a:fld>
             <a:endParaRPr lang="en-US"/>
           </a:p>
@@ -2643,7 +2643,7 @@
           <a:p>
             <a:fld id="{BAA8DE05-51EE-4692-B197-877FA1DAAAED}" type="datetimeFigureOut">
               <a:rPr lang="en-US" smtClean="0"/>
-              <a:t>9/11/24</a:t>
+              <a:t>9/11/2024</a:t>
             </a:fld>
             <a:endParaRPr lang="en-US"/>
           </a:p>
@@ -2918,7 +2918,7 @@
           <a:p>
             <a:fld id="{BAA8DE05-51EE-4692-B197-877FA1DAAAED}" type="datetimeFigureOut">
               <a:rPr lang="en-US" smtClean="0"/>
-              <a:t>9/11/24</a:t>
+              <a:t>9/11/2024</a:t>
             </a:fld>
             <a:endParaRPr lang="en-US"/>
           </a:p>
@@ -3183,7 +3183,7 @@
           <a:p>
             <a:fld id="{BAA8DE05-51EE-4692-B197-877FA1DAAAED}" type="datetimeFigureOut">
               <a:rPr lang="en-US" smtClean="0"/>
-              <a:t>9/11/24</a:t>
+              <a:t>9/11/2024</a:t>
             </a:fld>
             <a:endParaRPr lang="en-US"/>
           </a:p>
@@ -3595,7 +3595,7 @@
           <a:p>
             <a:fld id="{BAA8DE05-51EE-4692-B197-877FA1DAAAED}" type="datetimeFigureOut">
               <a:rPr lang="en-US" smtClean="0"/>
-              <a:t>9/11/24</a:t>
+              <a:t>9/11/2024</a:t>
             </a:fld>
             <a:endParaRPr lang="en-US"/>
           </a:p>
@@ -3736,7 +3736,7 @@
           <a:p>
             <a:fld id="{BAA8DE05-51EE-4692-B197-877FA1DAAAED}" type="datetimeFigureOut">
               <a:rPr lang="en-US" smtClean="0"/>
-              <a:t>9/11/24</a:t>
+              <a:t>9/11/2024</a:t>
             </a:fld>
             <a:endParaRPr lang="en-US"/>
           </a:p>
@@ -3849,7 +3849,7 @@
           <a:p>
             <a:fld id="{BAA8DE05-51EE-4692-B197-877FA1DAAAED}" type="datetimeFigureOut">
               <a:rPr lang="en-US" smtClean="0"/>
-              <a:t>9/11/24</a:t>
+              <a:t>9/11/2024</a:t>
             </a:fld>
             <a:endParaRPr lang="en-US"/>
           </a:p>
@@ -4160,7 +4160,7 @@
           <a:p>
             <a:fld id="{BAA8DE05-51EE-4692-B197-877FA1DAAAED}" type="datetimeFigureOut">
               <a:rPr lang="en-US" smtClean="0"/>
-              <a:t>9/11/24</a:t>
+              <a:t>9/11/2024</a:t>
             </a:fld>
             <a:endParaRPr lang="en-US"/>
           </a:p>
@@ -4448,7 +4448,7 @@
           <a:p>
             <a:fld id="{BAA8DE05-51EE-4692-B197-877FA1DAAAED}" type="datetimeFigureOut">
               <a:rPr lang="en-US" smtClean="0"/>
-              <a:t>9/11/24</a:t>
+              <a:t>9/11/2024</a:t>
             </a:fld>
             <a:endParaRPr lang="en-US"/>
           </a:p>
@@ -4689,7 +4689,7 @@
           <a:p>
             <a:fld id="{BAA8DE05-51EE-4692-B197-877FA1DAAAED}" type="datetimeFigureOut">
               <a:rPr lang="en-US" smtClean="0"/>
-              <a:t>9/11/24</a:t>
+              <a:t>9/11/2024</a:t>
             </a:fld>
             <a:endParaRPr lang="en-US"/>
           </a:p>
@@ -6285,7 +6285,7 @@
             <a:pPr algn="l"/>
             <a:r>
               <a:rPr lang="en-US" sz="1800" dirty="0"/>
-              <a:t>- Constructor is callable when using … and … (except … and …)</a:t>
+              <a:t>- Constructor is callable when using … (except … and …)</a:t>
             </a:r>
           </a:p>
           <a:p>
@@ -8043,7 +8043,7 @@
             </a:pPr>
             <a:r>
               <a:rPr lang="en-US" sz="1800" dirty="0"/>
-              <a:t>All variable declared in switch, if/else, while/for loop will have a visibility …</a:t>
+              <a:t>All variable declared in switch, if/else, for loop will have a visibility …</a:t>
             </a:r>
           </a:p>
           <a:p>
@@ -11937,38 +11937,6 @@
             </a:r>
           </a:p>
           <a:p>
-            <a:pPr marL="285750" indent="-285750" algn="l">
-              <a:buFontTx/>
-              <a:buChar char="-"/>
-            </a:pPr>
-            <a:r>
-              <a:rPr lang="en-US" sz="1800" dirty="0"/>
-              <a:t>The code we just illustrated has a serious bug =&gt; this is called </a:t>
-            </a:r>
-            <a:r>
-              <a:rPr lang="en-US" sz="1800" b="1" dirty="0"/>
-              <a:t>shadowing</a:t>
-            </a:r>
-            <a:r>
-              <a:rPr lang="en-US" sz="1800" dirty="0"/>
-              <a:t> </a:t>
-            </a:r>
-          </a:p>
-          <a:p>
-            <a:pPr marL="285750" indent="-285750" algn="l">
-              <a:buFontTx/>
-              <a:buChar char="-"/>
-            </a:pPr>
-            <a:r>
-              <a:rPr lang="en-US" sz="1800" dirty="0"/>
-              <a:t>Shadowed variable requires more information to be accessible </a:t>
-            </a:r>
-            <a:r>
-              <a:rPr lang="en-US" sz="800" dirty="0"/>
-              <a:t>(mentioning about ”this”)</a:t>
-            </a:r>
-          </a:p>
-          <a:p>
             <a:pPr algn="l"/>
             <a:r>
               <a:rPr lang="en-US" sz="1800" dirty="0"/>
@@ -12509,105 +12477,7 @@
                                         <p:tgtEl>
                                           <p:spTgt spid="4">
                                             <p:txEl>
-                                              <p:pRg st="10" end="10"/>
-                                            </p:txEl>
-                                          </p:spTgt>
-                                        </p:tgtEl>
-                                        <p:attrNameLst>
-                                          <p:attrName>style.visibility</p:attrName>
-                                        </p:attrNameLst>
-                                      </p:cBhvr>
-                                      <p:to>
-                                        <p:strVal val="visible"/>
-                                      </p:to>
-                                    </p:set>
-                                  </p:childTnLst>
-                                </p:cTn>
-                              </p:par>
-                            </p:childTnLst>
-                          </p:cTn>
-                        </p:par>
-                      </p:childTnLst>
-                    </p:cTn>
-                  </p:par>
-                  <p:par>
-                    <p:cTn id="43" fill="hold">
-                      <p:stCondLst>
-                        <p:cond delay="indefinite"/>
-                      </p:stCondLst>
-                      <p:childTnLst>
-                        <p:par>
-                          <p:cTn id="44" fill="hold">
-                            <p:stCondLst>
-                              <p:cond delay="0"/>
-                            </p:stCondLst>
-                            <p:childTnLst>
-                              <p:par>
-                                <p:cTn id="45" presetID="1" presetClass="entr" presetSubtype="0" fill="hold" nodeType="clickEffect">
-                                  <p:stCondLst>
-                                    <p:cond delay="0"/>
-                                  </p:stCondLst>
-                                  <p:childTnLst>
-                                    <p:set>
-                                      <p:cBhvr>
-                                        <p:cTn id="46" dur="1" fill="hold">
-                                          <p:stCondLst>
-                                            <p:cond delay="0"/>
-                                          </p:stCondLst>
-                                        </p:cTn>
-                                        <p:tgtEl>
-                                          <p:spTgt spid="4">
-                                            <p:txEl>
                                               <p:pRg st="11" end="11"/>
-                                            </p:txEl>
-                                          </p:spTgt>
-                                        </p:tgtEl>
-                                        <p:attrNameLst>
-                                          <p:attrName>style.visibility</p:attrName>
-                                        </p:attrNameLst>
-                                      </p:cBhvr>
-                                      <p:to>
-                                        <p:strVal val="visible"/>
-                                      </p:to>
-                                    </p:set>
-                                  </p:childTnLst>
-                                </p:cTn>
-                              </p:par>
-                            </p:childTnLst>
-                          </p:cTn>
-                        </p:par>
-                      </p:childTnLst>
-                    </p:cTn>
-                  </p:par>
-                  <p:par>
-                    <p:cTn id="47" fill="hold">
-                      <p:stCondLst>
-                        <p:cond delay="indefinite"/>
-                      </p:stCondLst>
-                      <p:childTnLst>
-                        <p:par>
-                          <p:cTn id="48" fill="hold">
-                            <p:stCondLst>
-                              <p:cond delay="0"/>
-                            </p:stCondLst>
-                            <p:childTnLst>
-                              <p:par>
-                                <p:cTn id="49" presetID="1" presetClass="entr" presetSubtype="0" fill="hold" nodeType="clickEffect">
-                                  <p:stCondLst>
-                                    <p:cond delay="0"/>
-                                  </p:stCondLst>
-                                  <p:childTnLst>
-                                    <p:set>
-                                      <p:cBhvr>
-                                        <p:cTn id="50" dur="1" fill="hold">
-                                          <p:stCondLst>
-                                            <p:cond delay="0"/>
-                                          </p:stCondLst>
-                                        </p:cTn>
-                                        <p:tgtEl>
-                                          <p:spTgt spid="4">
-                                            <p:txEl>
-                                              <p:pRg st="13" end="13"/>
                                             </p:txEl>
                                           </p:spTgt>
                                         </p:tgtEl>
@@ -12968,7 +12838,7 @@
             </a:r>
             <a:r>
               <a:rPr lang="en-US" sz="1800" b="1" dirty="0"/>
-              <a:t>“this” is also not usable to static field</a:t>
+              <a:t>“this” is also not usable to static method, initializer</a:t>
             </a:r>
             <a:r>
               <a:rPr lang="en-US" sz="1800" dirty="0"/>

</xml_diff>